<commit_message>
Write intro slides, add pdf version of title, add github .png screenshot.
</commit_message>
<xml_diff>
--- a/talks/talks-manual-figures/pacea-release-title-slide.pptx
+++ b/talks/talks-manual-figures/pacea-release-title-slide.pptx
@@ -4482,16 +4482,7 @@
                 </a:solidFill>
                 <a:latin typeface="Arial" charset="0"/>
               </a:rPr>
-              <a:t>of</a:t>
-            </a:r>
-            <a:r>
-              <a:rPr lang="en-US" sz="3200" dirty="0" smtClean="0">
-                <a:solidFill>
-                  <a:srgbClr val="0000CC"/>
-                </a:solidFill>
-                <a:latin typeface="Arial" charset="0"/>
-              </a:rPr>
-              <a:t> ecosystem information to help facilitate an ecosystem approach </a:t>
+              <a:t>of ecosystem information to help facilitate an ecosystem approach </a:t>
             </a:r>
             <a:r>
               <a:rPr lang="en-US" sz="3200" dirty="0">
@@ -4586,16 +4577,7 @@
                 </a:solidFill>
                 <a:latin typeface="Arial" charset="0"/>
               </a:rPr>
-              <a:t>Friday </a:t>
-            </a:r>
-            <a:r>
-              <a:rPr lang="en-GB" sz="2000" b="1" dirty="0" smtClean="0">
-                <a:solidFill>
-                  <a:srgbClr val="3333CC"/>
-                </a:solidFill>
-                <a:latin typeface="Arial" charset="0"/>
-              </a:rPr>
-              <a:t>10</a:t>
+              <a:t>Friday 10</a:t>
             </a:r>
             <a:r>
               <a:rPr lang="en-GB" sz="2000" b="1" baseline="30000" dirty="0" smtClean="0">

</xml_diff>